<commit_message>
add one future feature.
</commit_message>
<xml_diff>
--- a/Queer Quote presentation.pptx
+++ b/Queer Quote presentation.pptx
@@ -5199,7 +5199,7 @@
         <p:spPr>
           <a:xfrm>
             <a:off x="739775" y="2379371"/>
-            <a:ext cx="7662864" cy="3267169"/>
+            <a:ext cx="7662864" cy="4246637"/>
           </a:xfrm>
         </p:spPr>
         <p:txBody>
@@ -5251,7 +5251,21 @@
             </a:r>
             <a:r>
               <a:rPr lang="en-US" sz="2400" dirty="0" smtClean="0"/>
-              <a:t>player embeddable so anyone can put it on their site</a:t>
+              <a:t>player embeddable so anyone can put it on their </a:t>
+            </a:r>
+            <a:r>
+              <a:rPr lang="en-US" sz="2400" dirty="0" smtClean="0"/>
+              <a:t>site</a:t>
+            </a:r>
+          </a:p>
+          <a:p>
+            <a:r>
+              <a:rPr lang="en-US" dirty="0" smtClean="0"/>
+              <a:t>Incorporate cover art into </a:t>
+            </a:r>
+            <a:r>
+              <a:rPr lang="en-US" smtClean="0"/>
+              <a:t>quote images</a:t>
             </a:r>
             <a:endParaRPr lang="en-US" dirty="0"/>
           </a:p>

</xml_diff>